<commit_message>
Updated presentation, updated mappings for IMDB database
</commit_message>
<xml_diff>
--- a/Elasticsearch - April 2016.pptx
+++ b/Elasticsearch - April 2016.pptx
@@ -319,7 +319,7 @@
           <a:p>
             <a:fld id="{241E0AED-7330-4A36-8503-3FCCDDE40A1D}" type="datetimeFigureOut">
               <a:rPr lang="en-US" smtClean="0"/>
-              <a:t>3/11/2016</a:t>
+              <a:t>4/9/2016</a:t>
             </a:fld>
             <a:endParaRPr lang="en-US"/>
           </a:p>
@@ -1337,7 +1337,7 @@
           <a:p>
             <a:fld id="{88D6AC07-D6EE-4AEA-86E0-00B9C28D6FF8}" type="datetimeFigureOut">
               <a:rPr lang="en-US" smtClean="0"/>
-              <a:t>3/11/2016</a:t>
+              <a:t>4/9/2016</a:t>
             </a:fld>
             <a:endParaRPr lang="en-US"/>
           </a:p>
@@ -1507,7 +1507,7 @@
           <a:p>
             <a:fld id="{88D6AC07-D6EE-4AEA-86E0-00B9C28D6FF8}" type="datetimeFigureOut">
               <a:rPr lang="en-US" smtClean="0"/>
-              <a:t>3/11/2016</a:t>
+              <a:t>4/9/2016</a:t>
             </a:fld>
             <a:endParaRPr lang="en-US"/>
           </a:p>
@@ -1687,7 +1687,7 @@
           <a:p>
             <a:fld id="{88D6AC07-D6EE-4AEA-86E0-00B9C28D6FF8}" type="datetimeFigureOut">
               <a:rPr lang="en-US" smtClean="0"/>
-              <a:t>3/11/2016</a:t>
+              <a:t>4/9/2016</a:t>
             </a:fld>
             <a:endParaRPr lang="en-US"/>
           </a:p>
@@ -1855,7 +1855,7 @@
           <a:p>
             <a:fld id="{88D6AC07-D6EE-4AEA-86E0-00B9C28D6FF8}" type="datetimeFigureOut">
               <a:rPr lang="en-US" smtClean="0"/>
-              <a:t>3/11/2016</a:t>
+              <a:t>4/9/2016</a:t>
             </a:fld>
             <a:endParaRPr lang="en-US"/>
           </a:p>
@@ -2405,7 +2405,7 @@
           <a:p>
             <a:fld id="{88D6AC07-D6EE-4AEA-86E0-00B9C28D6FF8}" type="datetimeFigureOut">
               <a:rPr lang="en-US" smtClean="0"/>
-              <a:t>3/11/2016</a:t>
+              <a:t>4/9/2016</a:t>
             </a:fld>
             <a:endParaRPr lang="en-US"/>
           </a:p>
@@ -2651,7 +2651,7 @@
           <a:p>
             <a:fld id="{88D6AC07-D6EE-4AEA-86E0-00B9C28D6FF8}" type="datetimeFigureOut">
               <a:rPr lang="en-US" smtClean="0"/>
-              <a:t>3/11/2016</a:t>
+              <a:t>4/9/2016</a:t>
             </a:fld>
             <a:endParaRPr lang="en-US"/>
           </a:p>
@@ -2883,7 +2883,7 @@
           <a:p>
             <a:fld id="{88D6AC07-D6EE-4AEA-86E0-00B9C28D6FF8}" type="datetimeFigureOut">
               <a:rPr lang="en-US" smtClean="0"/>
-              <a:t>3/11/2016</a:t>
+              <a:t>4/9/2016</a:t>
             </a:fld>
             <a:endParaRPr lang="en-US"/>
           </a:p>
@@ -3250,7 +3250,7 @@
           <a:p>
             <a:fld id="{88D6AC07-D6EE-4AEA-86E0-00B9C28D6FF8}" type="datetimeFigureOut">
               <a:rPr lang="en-US" smtClean="0"/>
-              <a:t>3/11/2016</a:t>
+              <a:t>4/9/2016</a:t>
             </a:fld>
             <a:endParaRPr lang="en-US"/>
           </a:p>
@@ -3368,7 +3368,7 @@
           <a:p>
             <a:fld id="{88D6AC07-D6EE-4AEA-86E0-00B9C28D6FF8}" type="datetimeFigureOut">
               <a:rPr lang="en-US" smtClean="0"/>
-              <a:t>3/11/2016</a:t>
+              <a:t>4/9/2016</a:t>
             </a:fld>
             <a:endParaRPr lang="en-US"/>
           </a:p>
@@ -3463,7 +3463,7 @@
           <a:p>
             <a:fld id="{88D6AC07-D6EE-4AEA-86E0-00B9C28D6FF8}" type="datetimeFigureOut">
               <a:rPr lang="en-US" smtClean="0"/>
-              <a:t>3/11/2016</a:t>
+              <a:t>4/9/2016</a:t>
             </a:fld>
             <a:endParaRPr lang="en-US"/>
           </a:p>
@@ -3860,7 +3860,7 @@
           <a:p>
             <a:fld id="{88D6AC07-D6EE-4AEA-86E0-00B9C28D6FF8}" type="datetimeFigureOut">
               <a:rPr lang="en-US" smtClean="0"/>
-              <a:t>3/11/2016</a:t>
+              <a:t>4/9/2016</a:t>
             </a:fld>
             <a:endParaRPr lang="en-US"/>
           </a:p>
@@ -4117,7 +4117,7 @@
           <a:p>
             <a:fld id="{88D6AC07-D6EE-4AEA-86E0-00B9C28D6FF8}" type="datetimeFigureOut">
               <a:rPr lang="en-US" smtClean="0"/>
-              <a:t>3/11/2016</a:t>
+              <a:t>4/9/2016</a:t>
             </a:fld>
             <a:endParaRPr lang="en-US"/>
           </a:p>
@@ -4339,7 +4339,7 @@
           <a:p>
             <a:fld id="{88D6AC07-D6EE-4AEA-86E0-00B9C28D6FF8}" type="datetimeFigureOut">
               <a:rPr lang="en-US" smtClean="0"/>
-              <a:t>3/11/2016</a:t>
+              <a:t>4/9/2016</a:t>
             </a:fld>
             <a:endParaRPr lang="en-US"/>
           </a:p>
@@ -10360,7 +10360,28 @@
                 <a:latin typeface="Myriad Pro Light" panose="020B0603030403020204" pitchFamily="34" charset="0"/>
                 <a:cs typeface="Arial" charset="0"/>
               </a:rPr>
-              <a:t>Marvel/Sense (browser)</a:t>
+              <a:t>Marvel/Sense (browser </a:t>
+            </a:r>
+            <a:r>
+              <a:rPr lang="en-US" sz="3200" b="1" spc="-100" dirty="0">
+                <a:ln w="3175">
+                  <a:noFill/>
+                </a:ln>
+                <a:latin typeface="Myriad Pro Light" panose="020B0603030403020204" pitchFamily="34" charset="0"/>
+                <a:cs typeface="Arial" charset="0"/>
+                <a:hlinkClick r:id="rId2"/>
+              </a:rPr>
+              <a:t>http://localhost:5601/app/sense</a:t>
+            </a:r>
+            <a:r>
+              <a:rPr lang="en-US" sz="3200" spc="-100" dirty="0">
+                <a:ln w="3175">
+                  <a:noFill/>
+                </a:ln>
+                <a:latin typeface="Myriad Pro Light" panose="020B0603030403020204" pitchFamily="34" charset="0"/>
+                <a:cs typeface="Arial" charset="0"/>
+              </a:rPr>
+              <a:t>)</a:t>
             </a:r>
           </a:p>
         </p:txBody>

</xml_diff>

<commit_message>
Last minute changes :)
More changes
</commit_message>
<xml_diff>
--- a/Elasticsearch - April 2016.pptx
+++ b/Elasticsearch - April 2016.pptx
@@ -319,7 +319,7 @@
           <a:p>
             <a:fld id="{241E0AED-7330-4A36-8503-3FCCDDE40A1D}" type="datetimeFigureOut">
               <a:rPr lang="en-US" smtClean="0"/>
-              <a:t>4/9/2016</a:t>
+              <a:t>4/11/2016</a:t>
             </a:fld>
             <a:endParaRPr lang="en-US"/>
           </a:p>
@@ -1337,7 +1337,7 @@
           <a:p>
             <a:fld id="{88D6AC07-D6EE-4AEA-86E0-00B9C28D6FF8}" type="datetimeFigureOut">
               <a:rPr lang="en-US" smtClean="0"/>
-              <a:t>4/9/2016</a:t>
+              <a:t>4/11/2016</a:t>
             </a:fld>
             <a:endParaRPr lang="en-US"/>
           </a:p>
@@ -1507,7 +1507,7 @@
           <a:p>
             <a:fld id="{88D6AC07-D6EE-4AEA-86E0-00B9C28D6FF8}" type="datetimeFigureOut">
               <a:rPr lang="en-US" smtClean="0"/>
-              <a:t>4/9/2016</a:t>
+              <a:t>4/11/2016</a:t>
             </a:fld>
             <a:endParaRPr lang="en-US"/>
           </a:p>
@@ -1687,7 +1687,7 @@
           <a:p>
             <a:fld id="{88D6AC07-D6EE-4AEA-86E0-00B9C28D6FF8}" type="datetimeFigureOut">
               <a:rPr lang="en-US" smtClean="0"/>
-              <a:t>4/9/2016</a:t>
+              <a:t>4/11/2016</a:t>
             </a:fld>
             <a:endParaRPr lang="en-US"/>
           </a:p>
@@ -1855,7 +1855,7 @@
           <a:p>
             <a:fld id="{88D6AC07-D6EE-4AEA-86E0-00B9C28D6FF8}" type="datetimeFigureOut">
               <a:rPr lang="en-US" smtClean="0"/>
-              <a:t>4/9/2016</a:t>
+              <a:t>4/11/2016</a:t>
             </a:fld>
             <a:endParaRPr lang="en-US"/>
           </a:p>
@@ -2405,7 +2405,7 @@
           <a:p>
             <a:fld id="{88D6AC07-D6EE-4AEA-86E0-00B9C28D6FF8}" type="datetimeFigureOut">
               <a:rPr lang="en-US" smtClean="0"/>
-              <a:t>4/9/2016</a:t>
+              <a:t>4/11/2016</a:t>
             </a:fld>
             <a:endParaRPr lang="en-US"/>
           </a:p>
@@ -2651,7 +2651,7 @@
           <a:p>
             <a:fld id="{88D6AC07-D6EE-4AEA-86E0-00B9C28D6FF8}" type="datetimeFigureOut">
               <a:rPr lang="en-US" smtClean="0"/>
-              <a:t>4/9/2016</a:t>
+              <a:t>4/11/2016</a:t>
             </a:fld>
             <a:endParaRPr lang="en-US"/>
           </a:p>
@@ -2883,7 +2883,7 @@
           <a:p>
             <a:fld id="{88D6AC07-D6EE-4AEA-86E0-00B9C28D6FF8}" type="datetimeFigureOut">
               <a:rPr lang="en-US" smtClean="0"/>
-              <a:t>4/9/2016</a:t>
+              <a:t>4/11/2016</a:t>
             </a:fld>
             <a:endParaRPr lang="en-US"/>
           </a:p>
@@ -3250,7 +3250,7 @@
           <a:p>
             <a:fld id="{88D6AC07-D6EE-4AEA-86E0-00B9C28D6FF8}" type="datetimeFigureOut">
               <a:rPr lang="en-US" smtClean="0"/>
-              <a:t>4/9/2016</a:t>
+              <a:t>4/11/2016</a:t>
             </a:fld>
             <a:endParaRPr lang="en-US"/>
           </a:p>
@@ -3368,7 +3368,7 @@
           <a:p>
             <a:fld id="{88D6AC07-D6EE-4AEA-86E0-00B9C28D6FF8}" type="datetimeFigureOut">
               <a:rPr lang="en-US" smtClean="0"/>
-              <a:t>4/9/2016</a:t>
+              <a:t>4/11/2016</a:t>
             </a:fld>
             <a:endParaRPr lang="en-US"/>
           </a:p>
@@ -3463,7 +3463,7 @@
           <a:p>
             <a:fld id="{88D6AC07-D6EE-4AEA-86E0-00B9C28D6FF8}" type="datetimeFigureOut">
               <a:rPr lang="en-US" smtClean="0"/>
-              <a:t>4/9/2016</a:t>
+              <a:t>4/11/2016</a:t>
             </a:fld>
             <a:endParaRPr lang="en-US"/>
           </a:p>
@@ -3860,7 +3860,7 @@
           <a:p>
             <a:fld id="{88D6AC07-D6EE-4AEA-86E0-00B9C28D6FF8}" type="datetimeFigureOut">
               <a:rPr lang="en-US" smtClean="0"/>
-              <a:t>4/9/2016</a:t>
+              <a:t>4/11/2016</a:t>
             </a:fld>
             <a:endParaRPr lang="en-US"/>
           </a:p>
@@ -4117,7 +4117,7 @@
           <a:p>
             <a:fld id="{88D6AC07-D6EE-4AEA-86E0-00B9C28D6FF8}" type="datetimeFigureOut">
               <a:rPr lang="en-US" smtClean="0"/>
-              <a:t>4/9/2016</a:t>
+              <a:t>4/11/2016</a:t>
             </a:fld>
             <a:endParaRPr lang="en-US"/>
           </a:p>
@@ -4339,7 +4339,7 @@
           <a:p>
             <a:fld id="{88D6AC07-D6EE-4AEA-86E0-00B9C28D6FF8}" type="datetimeFigureOut">
               <a:rPr lang="en-US" smtClean="0"/>
-              <a:t>4/9/2016</a:t>
+              <a:t>4/11/2016</a:t>
             </a:fld>
             <a:endParaRPr lang="en-US"/>
           </a:p>
@@ -13156,19 +13156,27 @@
           <a:p>
             <a:r>
               <a:rPr lang="en-US" sz="3600" dirty="0"/>
-              <a:t>Raw </a:t>
-            </a:r>
-            <a:r>
-              <a:rPr lang="en-US" sz="3600" dirty="0" err="1"/>
-              <a:t>System.Net</a:t>
+              <a:t>Using C#’s </a:t>
+            </a:r>
+            <a:r>
+              <a:rPr lang="en-US" sz="3600" dirty="0" err="1">
+                <a:solidFill>
+                  <a:srgbClr val="FF0000"/>
+                </a:solidFill>
+              </a:rPr>
+              <a:t>WebRequest</a:t>
             </a:r>
             <a:r>
               <a:rPr lang="en-US" sz="3600" dirty="0"/>
-              <a:t> way handling </a:t>
-            </a:r>
-            <a:r>
-              <a:rPr lang="en-US" sz="3600" dirty="0" err="1"/>
-              <a:t>httprequest</a:t>
+              <a:t> or </a:t>
+            </a:r>
+            <a:r>
+              <a:rPr lang="en-US" sz="3600" dirty="0" err="1">
+                <a:solidFill>
+                  <a:srgbClr val="FF0000"/>
+                </a:solidFill>
+              </a:rPr>
+              <a:t>HttpClient</a:t>
             </a:r>
             <a:br>
               <a:rPr lang="en-US" sz="3600" dirty="0"/>
@@ -13238,7 +13246,9 @@
         </p:nvSpPr>
         <p:spPr/>
         <p:txBody>
-          <a:bodyPr/>
+          <a:bodyPr>
+            <a:noAutofit/>
+          </a:bodyPr>
           <a:lstStyle/>
           <a:p>
             <a:r>
@@ -13247,14 +13257,14 @@
                   <a:srgbClr val="FFFF00"/>
                 </a:solidFill>
               </a:rPr>
-              <a:t>     Two drivers: Elasticsearch.NET or Nest</a:t>
-            </a:r>
-          </a:p>
-        </p:txBody>
-      </p:sp>
-      <p:sp>
-        <p:nvSpPr>
-          <p:cNvPr id="3" name="Text Placeholder 2"/>
+              <a:t>     Two drivers: Elasticsearch.NET &amp; Nest</a:t>
+            </a:r>
+          </a:p>
+        </p:txBody>
+      </p:sp>
+      <p:sp>
+        <p:nvSpPr>
+          <p:cNvPr id="4" name="Text Placeholder 3"/>
           <p:cNvSpPr>
             <a:spLocks noGrp="1"/>
           </p:cNvSpPr>
@@ -13262,15 +13272,24 @@
             <p:ph type="body" idx="1"/>
           </p:nvPr>
         </p:nvSpPr>
-        <p:spPr/>
+        <p:spPr>
+          <a:xfrm>
+            <a:off x="4828854" y="2702103"/>
+            <a:ext cx="1900719" cy="1491946"/>
+          </a:xfrm>
+        </p:spPr>
         <p:txBody>
           <a:bodyPr/>
           <a:lstStyle/>
           <a:p>
-            <a:r>
-              <a:rPr lang="en-US" dirty="0"/>
-              <a:t>Just show screenshots of the code difference.</a:t>
-            </a:r>
+            <a:pPr marL="0" indent="0">
+              <a:buNone/>
+            </a:pPr>
+            <a:r>
+              <a:rPr lang="en-US" sz="4800" dirty="0"/>
+              <a:t>DEMO</a:t>
+            </a:r>
+            <a:endParaRPr lang="en-US" dirty="0"/>
           </a:p>
         </p:txBody>
       </p:sp>
@@ -13316,8 +13335,8 @@
         </p:nvSpPr>
         <p:spPr>
           <a:xfrm>
-            <a:off x="1468821" y="2414643"/>
-            <a:ext cx="9672145" cy="1325563"/>
+            <a:off x="1304817" y="493376"/>
+            <a:ext cx="9842643" cy="1325563"/>
           </a:xfrm>
         </p:spPr>
         <p:txBody>
@@ -13332,8 +13351,55 @@
                   <a:srgbClr val="FFFF00"/>
                 </a:solidFill>
               </a:rPr>
-              <a:t>Blog Demo – CRUD Operations </a:t>
-            </a:r>
+              <a:t>MVC Example (</a:t>
+            </a:r>
+            <a:r>
+              <a:rPr lang="en-US" sz="5400" dirty="0" err="1">
+                <a:solidFill>
+                  <a:srgbClr val="FFFF00"/>
+                </a:solidFill>
+              </a:rPr>
+              <a:t>StackExchange</a:t>
+            </a:r>
+            <a:r>
+              <a:rPr lang="en-US" sz="5400" dirty="0">
+                <a:solidFill>
+                  <a:srgbClr val="FFFF00"/>
+                </a:solidFill>
+              </a:rPr>
+              <a:t> )</a:t>
+            </a:r>
+          </a:p>
+        </p:txBody>
+      </p:sp>
+      <p:sp>
+        <p:nvSpPr>
+          <p:cNvPr id="3" name="Text Placeholder 3"/>
+          <p:cNvSpPr>
+            <a:spLocks noGrp="1"/>
+          </p:cNvSpPr>
+          <p:nvPr>
+            <p:ph type="body" idx="1"/>
+          </p:nvPr>
+        </p:nvSpPr>
+        <p:spPr>
+          <a:xfrm>
+            <a:off x="4828854" y="2702103"/>
+            <a:ext cx="1900719" cy="1491946"/>
+          </a:xfrm>
+        </p:spPr>
+        <p:txBody>
+          <a:bodyPr/>
+          <a:lstStyle/>
+          <a:p>
+            <a:pPr marL="0" indent="0">
+              <a:buNone/>
+            </a:pPr>
+            <a:r>
+              <a:rPr lang="en-US" sz="4800" dirty="0"/>
+              <a:t>DEMO</a:t>
+            </a:r>
+            <a:endParaRPr lang="en-US" dirty="0"/>
           </a:p>
         </p:txBody>
       </p:sp>

</xml_diff>